<commit_message>
Make sure that we use "logistic map" instead of "logistic function"
</commit_message>
<xml_diff>
--- a/testing_part2.pptx
+++ b/testing_part2.pptx
@@ -6427,13 +6427,13 @@
               </a:ext>
             </a:extLst>
           </a:blip>
-          <a:srcRect l="8003" r="7754"/>
+          <a:srcRect l="8003" t="6362" r="7754"/>
           <a:stretch/>
         </p:blipFill>
         <p:spPr>
           <a:xfrm>
-            <a:off x="198000" y="2708920"/>
-            <a:ext cx="8748000" cy="3461494"/>
+            <a:off x="198000" y="2929136"/>
+            <a:ext cx="8748000" cy="3241278"/>
           </a:xfrm>
           <a:prstGeom prst="rect">
             <a:avLst/>
@@ -6628,13 +6628,13 @@
               </a:ext>
             </a:extLst>
           </a:blip>
-          <a:srcRect l="8003" r="7754"/>
+          <a:srcRect l="8003" t="6629" r="7754"/>
           <a:stretch/>
         </p:blipFill>
         <p:spPr>
           <a:xfrm>
-            <a:off x="198000" y="2695466"/>
-            <a:ext cx="8748000" cy="3461494"/>
+            <a:off x="198000" y="2924944"/>
+            <a:ext cx="8748000" cy="3232016"/>
           </a:xfrm>
           <a:prstGeom prst="rect">
             <a:avLst/>
@@ -6720,7 +6720,17 @@
             </a:pPr>
             <a:r>
               <a:rPr lang="en-GB" dirty="0"/>
-              <a:t>First fork the repo XY on GitHub and clone your own copy!</a:t>
+              <a:t>First fork the repo </a:t>
+            </a:r>
+            <a:r>
+              <a:rPr lang="en-US" dirty="0">
+                <a:hlinkClick r:id="rId2"/>
+              </a:rPr>
+              <a:t>https://github.com/ASPP/2021-bordeaux-testing-project</a:t>
+            </a:r>
+            <a:r>
+              <a:rPr lang="en-GB" dirty="0"/>
+              <a:t> on GitHub and clone your own copy!</a:t>
             </a:r>
           </a:p>
           <a:p>
@@ -6729,7 +6739,7 @@
             </a:pPr>
             <a:r>
               <a:rPr lang="en-GB" dirty="0"/>
-              <a:t>a) Implement the logistic function f(𝑥)=𝑟∗𝑥∗(1−𝑥) . Use `@parametrize` to test the function for the following cases:</a:t>
+              <a:t>a) Implement the logistic map f(𝑥)=𝑟∗𝑥∗(1−𝑥) . Use `@parametrize` to test the function for the following cases:</a:t>
             </a:r>
           </a:p>
           <a:p>
@@ -10551,8 +10561,13 @@
           <a:p>
             <a:r>
               <a:rPr lang="en-DE" dirty="0"/>
-              <a:t>A Pytest Solution?</a:t>
-            </a:r>
+              <a:t>A </a:t>
+            </a:r>
+            <a:r>
+              <a:rPr lang="en-DE"/>
+              <a:t>Pytest Solution</a:t>
+            </a:r>
+            <a:endParaRPr lang="en-DE" dirty="0"/>
           </a:p>
         </p:txBody>
       </p:sp>
@@ -10924,23 +10939,13 @@
         </p:spPr>
         <p:txBody>
           <a:bodyPr>
-            <a:normAutofit lnSpcReduction="10000"/>
+            <a:normAutofit/>
           </a:bodyPr>
           <a:lstStyle/>
           <a:p>
             <a:r>
               <a:rPr lang="en-DE" dirty="0"/>
               <a:t>Fixtures are functions that are run before the tests are executed</a:t>
-            </a:r>
-          </a:p>
-          <a:p>
-            <a:r>
-              <a:rPr lang="en-GB" dirty="0"/>
-              <a:t>W</a:t>
-            </a:r>
-            <a:r>
-              <a:rPr lang="en-DE" dirty="0"/>
-              <a:t>ith autouse, it is executed once before each test</a:t>
             </a:r>
           </a:p>
           <a:p>
@@ -12310,7 +12315,7 @@
             </a:r>
             <a:r>
               <a:rPr lang="de-DE" dirty="0" err="1"/>
-              <a:t>function</a:t>
+              <a:t>map</a:t>
             </a:r>
             <a:r>
               <a:rPr lang="de-DE" dirty="0"/>

</xml_diff>